<commit_message>
even fancier example images
</commit_message>
<xml_diff>
--- a/example-slides.pptx
+++ b/example-slides.pptx
@@ -106,6 +106,11 @@
       </a:defRPr>
     </a:lvl9pPr>
   </p:defaultTextStyle>
+  <p:extLst>
+    <p:ext uri="{EFAFB233-063F-42B5-8137-9DF3F51BA10A}">
+      <p15:sldGuideLst xmlns:p15="http://schemas.microsoft.com/office/powerpoint/2012/main"/>
+    </p:ext>
+  </p:extLst>
 </p:presentation>
 </file>
 
@@ -240,7 +245,7 @@
           <a:p>
             <a:fld id="{861C4B6A-F27C-4948-9880-25D44C7A557D}" type="datetimeFigureOut">
               <a:rPr lang="en-US" smtClean="0"/>
-              <a:t>1/18/2016</a:t>
+              <a:t>1/21/2016</a:t>
             </a:fld>
             <a:endParaRPr lang="en-US"/>
           </a:p>
@@ -410,7 +415,7 @@
           <a:p>
             <a:fld id="{861C4B6A-F27C-4948-9880-25D44C7A557D}" type="datetimeFigureOut">
               <a:rPr lang="en-US" smtClean="0"/>
-              <a:t>1/18/2016</a:t>
+              <a:t>1/21/2016</a:t>
             </a:fld>
             <a:endParaRPr lang="en-US"/>
           </a:p>
@@ -590,7 +595,7 @@
           <a:p>
             <a:fld id="{861C4B6A-F27C-4948-9880-25D44C7A557D}" type="datetimeFigureOut">
               <a:rPr lang="en-US" smtClean="0"/>
-              <a:t>1/18/2016</a:t>
+              <a:t>1/21/2016</a:t>
             </a:fld>
             <a:endParaRPr lang="en-US"/>
           </a:p>
@@ -760,7 +765,7 @@
           <a:p>
             <a:fld id="{861C4B6A-F27C-4948-9880-25D44C7A557D}" type="datetimeFigureOut">
               <a:rPr lang="en-US" smtClean="0"/>
-              <a:t>1/18/2016</a:t>
+              <a:t>1/21/2016</a:t>
             </a:fld>
             <a:endParaRPr lang="en-US"/>
           </a:p>
@@ -1006,7 +1011,7 @@
           <a:p>
             <a:fld id="{861C4B6A-F27C-4948-9880-25D44C7A557D}" type="datetimeFigureOut">
               <a:rPr lang="en-US" smtClean="0"/>
-              <a:t>1/18/2016</a:t>
+              <a:t>1/21/2016</a:t>
             </a:fld>
             <a:endParaRPr lang="en-US"/>
           </a:p>
@@ -1238,7 +1243,7 @@
           <a:p>
             <a:fld id="{861C4B6A-F27C-4948-9880-25D44C7A557D}" type="datetimeFigureOut">
               <a:rPr lang="en-US" smtClean="0"/>
-              <a:t>1/18/2016</a:t>
+              <a:t>1/21/2016</a:t>
             </a:fld>
             <a:endParaRPr lang="en-US"/>
           </a:p>
@@ -1605,7 +1610,7 @@
           <a:p>
             <a:fld id="{861C4B6A-F27C-4948-9880-25D44C7A557D}" type="datetimeFigureOut">
               <a:rPr lang="en-US" smtClean="0"/>
-              <a:t>1/18/2016</a:t>
+              <a:t>1/21/2016</a:t>
             </a:fld>
             <a:endParaRPr lang="en-US"/>
           </a:p>
@@ -1723,7 +1728,7 @@
           <a:p>
             <a:fld id="{861C4B6A-F27C-4948-9880-25D44C7A557D}" type="datetimeFigureOut">
               <a:rPr lang="en-US" smtClean="0"/>
-              <a:t>1/18/2016</a:t>
+              <a:t>1/21/2016</a:t>
             </a:fld>
             <a:endParaRPr lang="en-US"/>
           </a:p>
@@ -1818,7 +1823,7 @@
           <a:p>
             <a:fld id="{861C4B6A-F27C-4948-9880-25D44C7A557D}" type="datetimeFigureOut">
               <a:rPr lang="en-US" smtClean="0"/>
-              <a:t>1/18/2016</a:t>
+              <a:t>1/21/2016</a:t>
             </a:fld>
             <a:endParaRPr lang="en-US"/>
           </a:p>
@@ -2095,7 +2100,7 @@
           <a:p>
             <a:fld id="{861C4B6A-F27C-4948-9880-25D44C7A557D}" type="datetimeFigureOut">
               <a:rPr lang="en-US" smtClean="0"/>
-              <a:t>1/18/2016</a:t>
+              <a:t>1/21/2016</a:t>
             </a:fld>
             <a:endParaRPr lang="en-US"/>
           </a:p>
@@ -2348,7 +2353,7 @@
           <a:p>
             <a:fld id="{861C4B6A-F27C-4948-9880-25D44C7A557D}" type="datetimeFigureOut">
               <a:rPr lang="en-US" smtClean="0"/>
-              <a:t>1/18/2016</a:t>
+              <a:t>1/21/2016</a:t>
             </a:fld>
             <a:endParaRPr lang="en-US"/>
           </a:p>
@@ -2561,7 +2566,7 @@
           <a:p>
             <a:fld id="{861C4B6A-F27C-4948-9880-25D44C7A557D}" type="datetimeFigureOut">
               <a:rPr lang="en-US" smtClean="0"/>
-              <a:t>1/18/2016</a:t>
+              <a:t>1/21/2016</a:t>
             </a:fld>
             <a:endParaRPr lang="en-US"/>
           </a:p>
@@ -2980,6 +2985,9 @@
           <a:prstGeom prst="rect">
             <a:avLst/>
           </a:prstGeom>
+          <a:solidFill>
+            <a:schemeClr val="accent5"/>
+          </a:solidFill>
           <a:ln>
             <a:noFill/>
           </a:ln>
@@ -3033,33 +3041,10 @@
           <a:p>
             <a:pPr algn="ctr"/>
             <a:r>
-              <a:rPr lang="en-US" sz="23900" b="1" cap="none" spc="0" dirty="0" smtClean="0">
-                <a:ln w="12700">
-                  <a:solidFill>
-                    <a:schemeClr val="tx2">
-                      <a:lumMod val="75000"/>
-                    </a:schemeClr>
-                  </a:solidFill>
-                  <a:prstDash val="solid"/>
-                </a:ln>
-                <a:pattFill prst="dkUpDiag">
-                  <a:fgClr>
-                    <a:schemeClr val="tx2"/>
-                  </a:fgClr>
-                  <a:bgClr>
-                    <a:schemeClr val="tx2">
-                      <a:lumMod val="20000"/>
-                      <a:lumOff val="80000"/>
-                    </a:schemeClr>
-                  </a:bgClr>
-                </a:pattFill>
-                <a:effectLst>
-                  <a:outerShdw dist="38100" dir="2640000" algn="bl" rotWithShape="0">
-                    <a:schemeClr val="tx2">
-                      <a:lumMod val="75000"/>
-                    </a:schemeClr>
-                  </a:outerShdw>
-                </a:effectLst>
+              <a:rPr lang="en-US" sz="23900" dirty="0" smtClean="0">
+                <a:solidFill>
+                  <a:schemeClr val="bg1"/>
+                </a:solidFill>
               </a:rPr>
               <a:t>1</a:t>
             </a:r>
@@ -3072,17 +3057,9 @@
                 </a:solidFill>
                 <a:prstDash val="solid"/>
               </a:ln>
-              <a:pattFill prst="dkUpDiag">
-                <a:fgClr>
-                  <a:schemeClr val="tx2"/>
-                </a:fgClr>
-                <a:bgClr>
-                  <a:schemeClr val="tx2">
-                    <a:lumMod val="20000"/>
-                    <a:lumOff val="80000"/>
-                  </a:schemeClr>
-                </a:bgClr>
-              </a:pattFill>
+              <a:solidFill>
+                <a:schemeClr val="bg1"/>
+              </a:solidFill>
               <a:effectLst>
                 <a:outerShdw dist="38100" dir="2640000" algn="bl" rotWithShape="0">
                   <a:schemeClr val="tx2">
@@ -3094,112 +3071,312 @@
           </a:p>
         </p:txBody>
       </p:sp>
-      <p:sp>
-        <p:nvSpPr>
-          <p:cNvPr id="7" name="Half Frame 6"/>
-          <p:cNvSpPr/>
+      <p:grpSp>
+        <p:nvGrpSpPr>
+          <p:cNvPr id="4" name="Group 3"/>
+          <p:cNvGrpSpPr/>
           <p:nvPr/>
-        </p:nvSpPr>
-        <p:spPr>
+        </p:nvGrpSpPr>
+        <p:grpSpPr>
           <a:xfrm>
-            <a:off x="0" y="0"/>
-            <a:ext cx="1496291" cy="1496291"/>
+            <a:off x="0" y="-1"/>
+            <a:ext cx="914400" cy="457200"/>
+            <a:chOff x="0" y="-1"/>
+            <a:chExt cx="914400" cy="457200"/>
           </a:xfrm>
-          <a:prstGeom prst="halfFrame">
-            <a:avLst>
-              <a:gd name="adj1" fmla="val 15000"/>
-              <a:gd name="adj2" fmla="val 16666"/>
-            </a:avLst>
-          </a:prstGeom>
-          <a:noFill/>
-          <a:ln>
+        </p:grpSpPr>
+        <p:sp>
+          <p:nvSpPr>
+            <p:cNvPr id="2" name="Rectangle 1"/>
+            <p:cNvSpPr/>
+            <p:nvPr/>
+          </p:nvSpPr>
+          <p:spPr>
+            <a:xfrm>
+              <a:off x="0" y="-1"/>
+              <a:ext cx="914400" cy="457200"/>
+            </a:xfrm>
+            <a:prstGeom prst="rect">
+              <a:avLst/>
+            </a:prstGeom>
+            <a:solidFill>
+              <a:schemeClr val="bg1"/>
+            </a:solidFill>
+            <a:ln>
+              <a:noFill/>
+            </a:ln>
+          </p:spPr>
+          <p:style>
+            <a:lnRef idx="2">
+              <a:schemeClr val="accent1">
+                <a:shade val="50000"/>
+              </a:schemeClr>
+            </a:lnRef>
+            <a:fillRef idx="1">
+              <a:schemeClr val="accent1"/>
+            </a:fillRef>
+            <a:effectRef idx="0">
+              <a:schemeClr val="accent1"/>
+            </a:effectRef>
+            <a:fontRef idx="minor">
+              <a:schemeClr val="lt1"/>
+            </a:fontRef>
+          </p:style>
+          <p:txBody>
+            <a:bodyPr rtlCol="0" anchor="ctr"/>
+            <a:lstStyle/>
+            <a:p>
+              <a:pPr algn="ctr"/>
+              <a:endParaRPr lang="en-US" dirty="0"/>
+            </a:p>
+          </p:txBody>
+        </p:sp>
+        <p:sp>
+          <p:nvSpPr>
+            <p:cNvPr id="10" name="Rectangle 9"/>
+            <p:cNvSpPr/>
+            <p:nvPr/>
+          </p:nvSpPr>
+          <p:spPr>
+            <a:xfrm>
+              <a:off x="0" y="228599"/>
+              <a:ext cx="457200" cy="228600"/>
+            </a:xfrm>
+            <a:prstGeom prst="rect">
+              <a:avLst/>
+            </a:prstGeom>
             <a:solidFill>
               <a:schemeClr val="tx1"/>
             </a:solidFill>
-          </a:ln>
-        </p:spPr>
-        <p:style>
-          <a:lnRef idx="2">
-            <a:schemeClr val="accent1">
-              <a:shade val="50000"/>
-            </a:schemeClr>
-          </a:lnRef>
-          <a:fillRef idx="1">
-            <a:schemeClr val="accent1"/>
-          </a:fillRef>
-          <a:effectRef idx="0">
-            <a:schemeClr val="accent1"/>
-          </a:effectRef>
-          <a:fontRef idx="minor">
-            <a:schemeClr val="lt1"/>
-          </a:fontRef>
-        </p:style>
-        <p:txBody>
-          <a:bodyPr rtlCol="0" anchor="ctr"/>
-          <a:lstStyle/>
-          <a:p>
-            <a:pPr algn="ctr"/>
-            <a:endParaRPr lang="en-US">
-              <a:solidFill>
-                <a:schemeClr val="tx1"/>
-              </a:solidFill>
-            </a:endParaRPr>
-          </a:p>
-        </p:txBody>
-      </p:sp>
-      <p:sp>
-        <p:nvSpPr>
-          <p:cNvPr id="8" name="Half Frame 7"/>
-          <p:cNvSpPr/>
-          <p:nvPr/>
-        </p:nvSpPr>
-        <p:spPr>
-          <a:xfrm rot="10800000">
-            <a:off x="10695709" y="5361709"/>
-            <a:ext cx="1496291" cy="1496291"/>
-          </a:xfrm>
-          <a:prstGeom prst="halfFrame">
-            <a:avLst>
-              <a:gd name="adj1" fmla="val 15000"/>
-              <a:gd name="adj2" fmla="val 16666"/>
-            </a:avLst>
-          </a:prstGeom>
-          <a:noFill/>
-          <a:ln>
+            <a:ln>
+              <a:noFill/>
+            </a:ln>
+          </p:spPr>
+          <p:style>
+            <a:lnRef idx="2">
+              <a:schemeClr val="accent1">
+                <a:shade val="50000"/>
+              </a:schemeClr>
+            </a:lnRef>
+            <a:fillRef idx="1">
+              <a:schemeClr val="accent1"/>
+            </a:fillRef>
+            <a:effectRef idx="0">
+              <a:schemeClr val="accent1"/>
+            </a:effectRef>
+            <a:fontRef idx="minor">
+              <a:schemeClr val="lt1"/>
+            </a:fontRef>
+          </p:style>
+          <p:txBody>
+            <a:bodyPr rtlCol="0" anchor="ctr"/>
+            <a:lstStyle/>
+            <a:p>
+              <a:pPr algn="ctr"/>
+              <a:endParaRPr lang="en-US"/>
+            </a:p>
+          </p:txBody>
+        </p:sp>
+        <p:sp>
+          <p:nvSpPr>
+            <p:cNvPr id="11" name="Rectangle 10"/>
+            <p:cNvSpPr/>
+            <p:nvPr/>
+          </p:nvSpPr>
+          <p:spPr>
+            <a:xfrm>
+              <a:off x="457200" y="-1"/>
+              <a:ext cx="457200" cy="228600"/>
+            </a:xfrm>
+            <a:prstGeom prst="rect">
+              <a:avLst/>
+            </a:prstGeom>
             <a:solidFill>
               <a:schemeClr val="tx1"/>
             </a:solidFill>
-          </a:ln>
-        </p:spPr>
-        <p:style>
-          <a:lnRef idx="2">
-            <a:schemeClr val="accent1">
-              <a:shade val="50000"/>
-            </a:schemeClr>
-          </a:lnRef>
-          <a:fillRef idx="1">
-            <a:schemeClr val="accent1"/>
-          </a:fillRef>
-          <a:effectRef idx="0">
-            <a:schemeClr val="accent1"/>
-          </a:effectRef>
-          <a:fontRef idx="minor">
-            <a:schemeClr val="lt1"/>
-          </a:fontRef>
-        </p:style>
-        <p:txBody>
-          <a:bodyPr rtlCol="0" anchor="ctr"/>
-          <a:lstStyle/>
-          <a:p>
-            <a:pPr algn="ctr"/>
-            <a:endParaRPr lang="en-US">
-              <a:solidFill>
-                <a:schemeClr val="tx1"/>
-              </a:solidFill>
-            </a:endParaRPr>
-          </a:p>
-        </p:txBody>
-      </p:sp>
+            <a:ln>
+              <a:noFill/>
+            </a:ln>
+          </p:spPr>
+          <p:style>
+            <a:lnRef idx="2">
+              <a:schemeClr val="accent1">
+                <a:shade val="50000"/>
+              </a:schemeClr>
+            </a:lnRef>
+            <a:fillRef idx="1">
+              <a:schemeClr val="accent1"/>
+            </a:fillRef>
+            <a:effectRef idx="0">
+              <a:schemeClr val="accent1"/>
+            </a:effectRef>
+            <a:fontRef idx="minor">
+              <a:schemeClr val="lt1"/>
+            </a:fontRef>
+          </p:style>
+          <p:txBody>
+            <a:bodyPr rtlCol="0" anchor="ctr"/>
+            <a:lstStyle/>
+            <a:p>
+              <a:pPr algn="ctr"/>
+              <a:endParaRPr lang="en-US"/>
+            </a:p>
+          </p:txBody>
+        </p:sp>
+      </p:grpSp>
+      <p:grpSp>
+        <p:nvGrpSpPr>
+          <p:cNvPr id="12" name="Group 11"/>
+          <p:cNvGrpSpPr/>
+          <p:nvPr/>
+        </p:nvGrpSpPr>
+        <p:grpSpPr>
+          <a:xfrm>
+            <a:off x="11277600" y="6400800"/>
+            <a:ext cx="914400" cy="457200"/>
+            <a:chOff x="0" y="-1"/>
+            <a:chExt cx="914400" cy="457200"/>
+          </a:xfrm>
+        </p:grpSpPr>
+        <p:sp>
+          <p:nvSpPr>
+            <p:cNvPr id="13" name="Rectangle 12"/>
+            <p:cNvSpPr/>
+            <p:nvPr/>
+          </p:nvSpPr>
+          <p:spPr>
+            <a:xfrm>
+              <a:off x="0" y="-1"/>
+              <a:ext cx="914400" cy="457200"/>
+            </a:xfrm>
+            <a:prstGeom prst="rect">
+              <a:avLst/>
+            </a:prstGeom>
+            <a:solidFill>
+              <a:schemeClr val="bg1"/>
+            </a:solidFill>
+            <a:ln>
+              <a:noFill/>
+            </a:ln>
+          </p:spPr>
+          <p:style>
+            <a:lnRef idx="2">
+              <a:schemeClr val="accent1">
+                <a:shade val="50000"/>
+              </a:schemeClr>
+            </a:lnRef>
+            <a:fillRef idx="1">
+              <a:schemeClr val="accent1"/>
+            </a:fillRef>
+            <a:effectRef idx="0">
+              <a:schemeClr val="accent1"/>
+            </a:effectRef>
+            <a:fontRef idx="minor">
+              <a:schemeClr val="lt1"/>
+            </a:fontRef>
+          </p:style>
+          <p:txBody>
+            <a:bodyPr rtlCol="0" anchor="ctr"/>
+            <a:lstStyle/>
+            <a:p>
+              <a:pPr algn="ctr"/>
+              <a:endParaRPr lang="en-US" dirty="0"/>
+            </a:p>
+          </p:txBody>
+        </p:sp>
+        <p:sp>
+          <p:nvSpPr>
+            <p:cNvPr id="14" name="Rectangle 13"/>
+            <p:cNvSpPr/>
+            <p:nvPr/>
+          </p:nvSpPr>
+          <p:spPr>
+            <a:xfrm>
+              <a:off x="0" y="228599"/>
+              <a:ext cx="457200" cy="228600"/>
+            </a:xfrm>
+            <a:prstGeom prst="rect">
+              <a:avLst/>
+            </a:prstGeom>
+            <a:solidFill>
+              <a:schemeClr val="tx1"/>
+            </a:solidFill>
+            <a:ln>
+              <a:noFill/>
+            </a:ln>
+          </p:spPr>
+          <p:style>
+            <a:lnRef idx="2">
+              <a:schemeClr val="accent1">
+                <a:shade val="50000"/>
+              </a:schemeClr>
+            </a:lnRef>
+            <a:fillRef idx="1">
+              <a:schemeClr val="accent1"/>
+            </a:fillRef>
+            <a:effectRef idx="0">
+              <a:schemeClr val="accent1"/>
+            </a:effectRef>
+            <a:fontRef idx="minor">
+              <a:schemeClr val="lt1"/>
+            </a:fontRef>
+          </p:style>
+          <p:txBody>
+            <a:bodyPr rtlCol="0" anchor="ctr"/>
+            <a:lstStyle/>
+            <a:p>
+              <a:pPr algn="ctr"/>
+              <a:endParaRPr lang="en-US"/>
+            </a:p>
+          </p:txBody>
+        </p:sp>
+        <p:sp>
+          <p:nvSpPr>
+            <p:cNvPr id="15" name="Rectangle 14"/>
+            <p:cNvSpPr/>
+            <p:nvPr/>
+          </p:nvSpPr>
+          <p:spPr>
+            <a:xfrm>
+              <a:off x="457200" y="-1"/>
+              <a:ext cx="457200" cy="228600"/>
+            </a:xfrm>
+            <a:prstGeom prst="rect">
+              <a:avLst/>
+            </a:prstGeom>
+            <a:solidFill>
+              <a:schemeClr val="tx1"/>
+            </a:solidFill>
+            <a:ln>
+              <a:noFill/>
+            </a:ln>
+          </p:spPr>
+          <p:style>
+            <a:lnRef idx="2">
+              <a:schemeClr val="accent1">
+                <a:shade val="50000"/>
+              </a:schemeClr>
+            </a:lnRef>
+            <a:fillRef idx="1">
+              <a:schemeClr val="accent1"/>
+            </a:fillRef>
+            <a:effectRef idx="0">
+              <a:schemeClr val="accent1"/>
+            </a:effectRef>
+            <a:fontRef idx="minor">
+              <a:schemeClr val="lt1"/>
+            </a:fontRef>
+          </p:style>
+          <p:txBody>
+            <a:bodyPr rtlCol="0" anchor="ctr"/>
+            <a:lstStyle/>
+            <a:p>
+              <a:pPr algn="ctr"/>
+              <a:endParaRPr lang="en-US"/>
+            </a:p>
+          </p:txBody>
+        </p:sp>
+      </p:grpSp>
     </p:spTree>
     <p:extLst>
       <p:ext uri="{BB962C8B-B14F-4D97-AF65-F5344CB8AC3E}">
@@ -3232,31 +3409,36 @@
       </p:grpSpPr>
       <p:sp>
         <p:nvSpPr>
-          <p:cNvPr id="4" name="Right Triangle 3"/>
+          <p:cNvPr id="9" name="Rectangle 8"/>
           <p:cNvSpPr/>
           <p:nvPr/>
         </p:nvSpPr>
         <p:spPr>
-          <a:xfrm rot="5400000">
-            <a:off x="0" y="0"/>
-            <a:ext cx="1354975" cy="1354975"/>
+          <a:xfrm>
+            <a:off x="0" y="-1"/>
+            <a:ext cx="12192000" cy="6858001"/>
           </a:xfrm>
-          <a:prstGeom prst="rtTriangle">
+          <a:prstGeom prst="rect">
             <a:avLst/>
           </a:prstGeom>
-          <a:noFill/>
+          <a:solidFill>
+            <a:schemeClr val="accent6"/>
+          </a:solidFill>
+          <a:ln>
+            <a:noFill/>
+          </a:ln>
         </p:spPr>
         <p:style>
           <a:lnRef idx="2">
-            <a:schemeClr val="dk1">
+            <a:schemeClr val="accent1">
               <a:shade val="50000"/>
             </a:schemeClr>
           </a:lnRef>
           <a:fillRef idx="1">
-            <a:schemeClr val="dk1"/>
+            <a:schemeClr val="accent1"/>
           </a:fillRef>
           <a:effectRef idx="0">
-            <a:schemeClr val="dk1"/>
+            <a:schemeClr val="accent1"/>
           </a:effectRef>
           <a:fontRef idx="minor">
             <a:schemeClr val="lt1"/>
@@ -3295,33 +3477,10 @@
           <a:p>
             <a:pPr algn="ctr"/>
             <a:r>
-              <a:rPr lang="en-US" sz="23900" b="1" cap="none" spc="0" dirty="0" smtClean="0">
-                <a:ln w="12700">
-                  <a:solidFill>
-                    <a:schemeClr val="tx2">
-                      <a:lumMod val="75000"/>
-                    </a:schemeClr>
-                  </a:solidFill>
-                  <a:prstDash val="solid"/>
-                </a:ln>
-                <a:pattFill prst="dkUpDiag">
-                  <a:fgClr>
-                    <a:schemeClr val="tx2"/>
-                  </a:fgClr>
-                  <a:bgClr>
-                    <a:schemeClr val="tx2">
-                      <a:lumMod val="20000"/>
-                      <a:lumOff val="80000"/>
-                    </a:schemeClr>
-                  </a:bgClr>
-                </a:pattFill>
-                <a:effectLst>
-                  <a:outerShdw dist="38100" dir="2640000" algn="bl" rotWithShape="0">
-                    <a:schemeClr val="tx2">
-                      <a:lumMod val="75000"/>
-                    </a:schemeClr>
-                  </a:outerShdw>
-                </a:effectLst>
+              <a:rPr lang="en-US" sz="23900" dirty="0" smtClean="0">
+                <a:solidFill>
+                  <a:schemeClr val="bg1"/>
+                </a:solidFill>
               </a:rPr>
               <a:t>2</a:t>
             </a:r>
@@ -3334,17 +3493,9 @@
                 </a:solidFill>
                 <a:prstDash val="solid"/>
               </a:ln>
-              <a:pattFill prst="dkUpDiag">
-                <a:fgClr>
-                  <a:schemeClr val="tx2"/>
-                </a:fgClr>
-                <a:bgClr>
-                  <a:schemeClr val="tx2">
-                    <a:lumMod val="20000"/>
-                    <a:lumOff val="80000"/>
-                  </a:schemeClr>
-                </a:bgClr>
-              </a:pattFill>
+              <a:solidFill>
+                <a:schemeClr val="bg1"/>
+              </a:solidFill>
               <a:effectLst>
                 <a:outerShdw dist="38100" dir="2640000" algn="bl" rotWithShape="0">
                   <a:schemeClr val="tx2">
@@ -3356,51 +3507,316 @@
           </a:p>
         </p:txBody>
       </p:sp>
-      <p:sp>
-        <p:nvSpPr>
-          <p:cNvPr id="6" name="Right Triangle 5"/>
-          <p:cNvSpPr/>
+      <p:grpSp>
+        <p:nvGrpSpPr>
+          <p:cNvPr id="4" name="Group 3"/>
+          <p:cNvGrpSpPr/>
           <p:nvPr/>
-        </p:nvSpPr>
-        <p:spPr>
-          <a:xfrm rot="16200000">
-            <a:off x="10837025" y="5503025"/>
-            <a:ext cx="1354975" cy="1354975"/>
+        </p:nvGrpSpPr>
+        <p:grpSpPr>
+          <a:xfrm>
+            <a:off x="0" y="-1"/>
+            <a:ext cx="914400" cy="457200"/>
+            <a:chOff x="0" y="-1"/>
+            <a:chExt cx="914400" cy="457200"/>
           </a:xfrm>
-          <a:prstGeom prst="rtTriangle">
-            <a:avLst/>
-          </a:prstGeom>
-          <a:noFill/>
-        </p:spPr>
-        <p:style>
-          <a:lnRef idx="2">
-            <a:schemeClr val="dk1">
-              <a:shade val="50000"/>
-            </a:schemeClr>
-          </a:lnRef>
-          <a:fillRef idx="1">
-            <a:schemeClr val="dk1"/>
-          </a:fillRef>
-          <a:effectRef idx="0">
-            <a:schemeClr val="dk1"/>
-          </a:effectRef>
-          <a:fontRef idx="minor">
-            <a:schemeClr val="lt1"/>
-          </a:fontRef>
-        </p:style>
-        <p:txBody>
-          <a:bodyPr rtlCol="0" anchor="ctr"/>
-          <a:lstStyle/>
-          <a:p>
-            <a:pPr algn="ctr"/>
-            <a:endParaRPr lang="en-US"/>
-          </a:p>
-        </p:txBody>
-      </p:sp>
+        </p:grpSpPr>
+        <p:sp>
+          <p:nvSpPr>
+            <p:cNvPr id="2" name="Rectangle 1"/>
+            <p:cNvSpPr/>
+            <p:nvPr/>
+          </p:nvSpPr>
+          <p:spPr>
+            <a:xfrm>
+              <a:off x="0" y="-1"/>
+              <a:ext cx="914400" cy="457200"/>
+            </a:xfrm>
+            <a:prstGeom prst="rect">
+              <a:avLst/>
+            </a:prstGeom>
+            <a:solidFill>
+              <a:schemeClr val="bg1"/>
+            </a:solidFill>
+            <a:ln>
+              <a:noFill/>
+            </a:ln>
+          </p:spPr>
+          <p:style>
+            <a:lnRef idx="2">
+              <a:schemeClr val="accent1">
+                <a:shade val="50000"/>
+              </a:schemeClr>
+            </a:lnRef>
+            <a:fillRef idx="1">
+              <a:schemeClr val="accent1"/>
+            </a:fillRef>
+            <a:effectRef idx="0">
+              <a:schemeClr val="accent1"/>
+            </a:effectRef>
+            <a:fontRef idx="minor">
+              <a:schemeClr val="lt1"/>
+            </a:fontRef>
+          </p:style>
+          <p:txBody>
+            <a:bodyPr rtlCol="0" anchor="ctr"/>
+            <a:lstStyle/>
+            <a:p>
+              <a:pPr algn="ctr"/>
+              <a:endParaRPr lang="en-US" dirty="0"/>
+            </a:p>
+          </p:txBody>
+        </p:sp>
+        <p:sp>
+          <p:nvSpPr>
+            <p:cNvPr id="10" name="Rectangle 9"/>
+            <p:cNvSpPr/>
+            <p:nvPr/>
+          </p:nvSpPr>
+          <p:spPr>
+            <a:xfrm>
+              <a:off x="0" y="228599"/>
+              <a:ext cx="457200" cy="228600"/>
+            </a:xfrm>
+            <a:prstGeom prst="rect">
+              <a:avLst/>
+            </a:prstGeom>
+            <a:solidFill>
+              <a:schemeClr val="tx1"/>
+            </a:solidFill>
+            <a:ln>
+              <a:noFill/>
+            </a:ln>
+          </p:spPr>
+          <p:style>
+            <a:lnRef idx="2">
+              <a:schemeClr val="accent1">
+                <a:shade val="50000"/>
+              </a:schemeClr>
+            </a:lnRef>
+            <a:fillRef idx="1">
+              <a:schemeClr val="accent1"/>
+            </a:fillRef>
+            <a:effectRef idx="0">
+              <a:schemeClr val="accent1"/>
+            </a:effectRef>
+            <a:fontRef idx="minor">
+              <a:schemeClr val="lt1"/>
+            </a:fontRef>
+          </p:style>
+          <p:txBody>
+            <a:bodyPr rtlCol="0" anchor="ctr"/>
+            <a:lstStyle/>
+            <a:p>
+              <a:pPr algn="ctr"/>
+              <a:endParaRPr lang="en-US"/>
+            </a:p>
+          </p:txBody>
+        </p:sp>
+        <p:sp>
+          <p:nvSpPr>
+            <p:cNvPr id="11" name="Rectangle 10"/>
+            <p:cNvSpPr/>
+            <p:nvPr/>
+          </p:nvSpPr>
+          <p:spPr>
+            <a:xfrm>
+              <a:off x="457200" y="-1"/>
+              <a:ext cx="457200" cy="228600"/>
+            </a:xfrm>
+            <a:prstGeom prst="rect">
+              <a:avLst/>
+            </a:prstGeom>
+            <a:solidFill>
+              <a:schemeClr val="tx1"/>
+            </a:solidFill>
+            <a:ln>
+              <a:noFill/>
+            </a:ln>
+          </p:spPr>
+          <p:style>
+            <a:lnRef idx="2">
+              <a:schemeClr val="accent1">
+                <a:shade val="50000"/>
+              </a:schemeClr>
+            </a:lnRef>
+            <a:fillRef idx="1">
+              <a:schemeClr val="accent1"/>
+            </a:fillRef>
+            <a:effectRef idx="0">
+              <a:schemeClr val="accent1"/>
+            </a:effectRef>
+            <a:fontRef idx="minor">
+              <a:schemeClr val="lt1"/>
+            </a:fontRef>
+          </p:style>
+          <p:txBody>
+            <a:bodyPr rtlCol="0" anchor="ctr"/>
+            <a:lstStyle/>
+            <a:p>
+              <a:pPr algn="ctr"/>
+              <a:endParaRPr lang="en-US"/>
+            </a:p>
+          </p:txBody>
+        </p:sp>
+      </p:grpSp>
+      <p:grpSp>
+        <p:nvGrpSpPr>
+          <p:cNvPr id="12" name="Group 11"/>
+          <p:cNvGrpSpPr/>
+          <p:nvPr/>
+        </p:nvGrpSpPr>
+        <p:grpSpPr>
+          <a:xfrm>
+            <a:off x="11277600" y="6400800"/>
+            <a:ext cx="914400" cy="457200"/>
+            <a:chOff x="0" y="-1"/>
+            <a:chExt cx="914400" cy="457200"/>
+          </a:xfrm>
+        </p:grpSpPr>
+        <p:sp>
+          <p:nvSpPr>
+            <p:cNvPr id="13" name="Rectangle 12"/>
+            <p:cNvSpPr/>
+            <p:nvPr/>
+          </p:nvSpPr>
+          <p:spPr>
+            <a:xfrm>
+              <a:off x="0" y="-1"/>
+              <a:ext cx="914400" cy="457200"/>
+            </a:xfrm>
+            <a:prstGeom prst="rect">
+              <a:avLst/>
+            </a:prstGeom>
+            <a:solidFill>
+              <a:schemeClr val="bg1"/>
+            </a:solidFill>
+            <a:ln>
+              <a:noFill/>
+            </a:ln>
+          </p:spPr>
+          <p:style>
+            <a:lnRef idx="2">
+              <a:schemeClr val="accent1">
+                <a:shade val="50000"/>
+              </a:schemeClr>
+            </a:lnRef>
+            <a:fillRef idx="1">
+              <a:schemeClr val="accent1"/>
+            </a:fillRef>
+            <a:effectRef idx="0">
+              <a:schemeClr val="accent1"/>
+            </a:effectRef>
+            <a:fontRef idx="minor">
+              <a:schemeClr val="lt1"/>
+            </a:fontRef>
+          </p:style>
+          <p:txBody>
+            <a:bodyPr rtlCol="0" anchor="ctr"/>
+            <a:lstStyle/>
+            <a:p>
+              <a:pPr algn="ctr"/>
+              <a:endParaRPr lang="en-US" dirty="0"/>
+            </a:p>
+          </p:txBody>
+        </p:sp>
+        <p:sp>
+          <p:nvSpPr>
+            <p:cNvPr id="14" name="Rectangle 13"/>
+            <p:cNvSpPr/>
+            <p:nvPr/>
+          </p:nvSpPr>
+          <p:spPr>
+            <a:xfrm>
+              <a:off x="0" y="228599"/>
+              <a:ext cx="457200" cy="228600"/>
+            </a:xfrm>
+            <a:prstGeom prst="rect">
+              <a:avLst/>
+            </a:prstGeom>
+            <a:solidFill>
+              <a:schemeClr val="tx1"/>
+            </a:solidFill>
+            <a:ln>
+              <a:noFill/>
+            </a:ln>
+          </p:spPr>
+          <p:style>
+            <a:lnRef idx="2">
+              <a:schemeClr val="accent1">
+                <a:shade val="50000"/>
+              </a:schemeClr>
+            </a:lnRef>
+            <a:fillRef idx="1">
+              <a:schemeClr val="accent1"/>
+            </a:fillRef>
+            <a:effectRef idx="0">
+              <a:schemeClr val="accent1"/>
+            </a:effectRef>
+            <a:fontRef idx="minor">
+              <a:schemeClr val="lt1"/>
+            </a:fontRef>
+          </p:style>
+          <p:txBody>
+            <a:bodyPr rtlCol="0" anchor="ctr"/>
+            <a:lstStyle/>
+            <a:p>
+              <a:pPr algn="ctr"/>
+              <a:endParaRPr lang="en-US"/>
+            </a:p>
+          </p:txBody>
+        </p:sp>
+        <p:sp>
+          <p:nvSpPr>
+            <p:cNvPr id="15" name="Rectangle 14"/>
+            <p:cNvSpPr/>
+            <p:nvPr/>
+          </p:nvSpPr>
+          <p:spPr>
+            <a:xfrm>
+              <a:off x="457200" y="-1"/>
+              <a:ext cx="457200" cy="228600"/>
+            </a:xfrm>
+            <a:prstGeom prst="rect">
+              <a:avLst/>
+            </a:prstGeom>
+            <a:solidFill>
+              <a:schemeClr val="tx1"/>
+            </a:solidFill>
+            <a:ln>
+              <a:noFill/>
+            </a:ln>
+          </p:spPr>
+          <p:style>
+            <a:lnRef idx="2">
+              <a:schemeClr val="accent1">
+                <a:shade val="50000"/>
+              </a:schemeClr>
+            </a:lnRef>
+            <a:fillRef idx="1">
+              <a:schemeClr val="accent1"/>
+            </a:fillRef>
+            <a:effectRef idx="0">
+              <a:schemeClr val="accent1"/>
+            </a:effectRef>
+            <a:fontRef idx="minor">
+              <a:schemeClr val="lt1"/>
+            </a:fontRef>
+          </p:style>
+          <p:txBody>
+            <a:bodyPr rtlCol="0" anchor="ctr"/>
+            <a:lstStyle/>
+            <a:p>
+              <a:pPr algn="ctr"/>
+              <a:endParaRPr lang="en-US"/>
+            </a:p>
+          </p:txBody>
+        </p:sp>
+      </p:grpSp>
     </p:spTree>
     <p:extLst>
       <p:ext uri="{BB962C8B-B14F-4D97-AF65-F5344CB8AC3E}">
-        <p14:creationId xmlns:p14="http://schemas.microsoft.com/office/powerpoint/2010/main" val="3763232077"/>
+        <p14:creationId xmlns:p14="http://schemas.microsoft.com/office/powerpoint/2010/main" val="2791033803"/>
       </p:ext>
     </p:extLst>
   </p:cSld>
@@ -3429,31 +3845,36 @@
       </p:grpSpPr>
       <p:sp>
         <p:nvSpPr>
-          <p:cNvPr id="4" name="Right Triangle 3"/>
+          <p:cNvPr id="9" name="Rectangle 8"/>
           <p:cNvSpPr/>
           <p:nvPr/>
         </p:nvSpPr>
         <p:spPr>
-          <a:xfrm rot="5400000">
-            <a:off x="0" y="0"/>
-            <a:ext cx="1354975" cy="1354975"/>
+          <a:xfrm>
+            <a:off x="0" y="-1"/>
+            <a:ext cx="12192000" cy="6858001"/>
           </a:xfrm>
-          <a:prstGeom prst="rtTriangle">
+          <a:prstGeom prst="rect">
             <a:avLst/>
           </a:prstGeom>
-          <a:noFill/>
+          <a:solidFill>
+            <a:schemeClr val="accent2"/>
+          </a:solidFill>
+          <a:ln>
+            <a:noFill/>
+          </a:ln>
         </p:spPr>
         <p:style>
           <a:lnRef idx="2">
-            <a:schemeClr val="dk1">
+            <a:schemeClr val="accent1">
               <a:shade val="50000"/>
             </a:schemeClr>
           </a:lnRef>
           <a:fillRef idx="1">
-            <a:schemeClr val="dk1"/>
+            <a:schemeClr val="accent1"/>
           </a:fillRef>
           <a:effectRef idx="0">
-            <a:schemeClr val="dk1"/>
+            <a:schemeClr val="accent1"/>
           </a:effectRef>
           <a:fontRef idx="minor">
             <a:schemeClr val="lt1"/>
@@ -3492,33 +3913,10 @@
           <a:p>
             <a:pPr algn="ctr"/>
             <a:r>
-              <a:rPr lang="en-US" sz="23900" b="1" dirty="0">
-                <a:ln w="12700">
-                  <a:solidFill>
-                    <a:schemeClr val="tx2">
-                      <a:lumMod val="75000"/>
-                    </a:schemeClr>
-                  </a:solidFill>
-                  <a:prstDash val="solid"/>
-                </a:ln>
-                <a:pattFill prst="dkUpDiag">
-                  <a:fgClr>
-                    <a:schemeClr val="tx2"/>
-                  </a:fgClr>
-                  <a:bgClr>
-                    <a:schemeClr val="tx2">
-                      <a:lumMod val="20000"/>
-                      <a:lumOff val="80000"/>
-                    </a:schemeClr>
-                  </a:bgClr>
-                </a:pattFill>
-                <a:effectLst>
-                  <a:outerShdw dist="38100" dir="2640000" algn="bl" rotWithShape="0">
-                    <a:schemeClr val="tx2">
-                      <a:lumMod val="75000"/>
-                    </a:schemeClr>
-                  </a:outerShdw>
-                </a:effectLst>
+              <a:rPr lang="en-US" sz="23900" dirty="0" smtClean="0">
+                <a:solidFill>
+                  <a:schemeClr val="bg1"/>
+                </a:solidFill>
               </a:rPr>
               <a:t>3</a:t>
             </a:r>
@@ -3531,17 +3929,9 @@
                 </a:solidFill>
                 <a:prstDash val="solid"/>
               </a:ln>
-              <a:pattFill prst="dkUpDiag">
-                <a:fgClr>
-                  <a:schemeClr val="tx2"/>
-                </a:fgClr>
-                <a:bgClr>
-                  <a:schemeClr val="tx2">
-                    <a:lumMod val="20000"/>
-                    <a:lumOff val="80000"/>
-                  </a:schemeClr>
-                </a:bgClr>
-              </a:pattFill>
+              <a:solidFill>
+                <a:schemeClr val="bg1"/>
+              </a:solidFill>
               <a:effectLst>
                 <a:outerShdw dist="38100" dir="2640000" algn="bl" rotWithShape="0">
                   <a:schemeClr val="tx2">
@@ -3553,51 +3943,316 @@
           </a:p>
         </p:txBody>
       </p:sp>
-      <p:sp>
-        <p:nvSpPr>
-          <p:cNvPr id="6" name="Right Triangle 5"/>
-          <p:cNvSpPr/>
+      <p:grpSp>
+        <p:nvGrpSpPr>
+          <p:cNvPr id="4" name="Group 3"/>
+          <p:cNvGrpSpPr/>
           <p:nvPr/>
-        </p:nvSpPr>
-        <p:spPr>
-          <a:xfrm rot="16200000">
-            <a:off x="10837025" y="5503025"/>
-            <a:ext cx="1354975" cy="1354975"/>
+        </p:nvGrpSpPr>
+        <p:grpSpPr>
+          <a:xfrm>
+            <a:off x="0" y="-1"/>
+            <a:ext cx="914400" cy="457200"/>
+            <a:chOff x="0" y="-1"/>
+            <a:chExt cx="914400" cy="457200"/>
           </a:xfrm>
-          <a:prstGeom prst="rtTriangle">
-            <a:avLst/>
-          </a:prstGeom>
-          <a:noFill/>
-        </p:spPr>
-        <p:style>
-          <a:lnRef idx="2">
-            <a:schemeClr val="dk1">
-              <a:shade val="50000"/>
-            </a:schemeClr>
-          </a:lnRef>
-          <a:fillRef idx="1">
-            <a:schemeClr val="dk1"/>
-          </a:fillRef>
-          <a:effectRef idx="0">
-            <a:schemeClr val="dk1"/>
-          </a:effectRef>
-          <a:fontRef idx="minor">
-            <a:schemeClr val="lt1"/>
-          </a:fontRef>
-        </p:style>
-        <p:txBody>
-          <a:bodyPr rtlCol="0" anchor="ctr"/>
-          <a:lstStyle/>
-          <a:p>
-            <a:pPr algn="ctr"/>
-            <a:endParaRPr lang="en-US"/>
-          </a:p>
-        </p:txBody>
-      </p:sp>
+        </p:grpSpPr>
+        <p:sp>
+          <p:nvSpPr>
+            <p:cNvPr id="2" name="Rectangle 1"/>
+            <p:cNvSpPr/>
+            <p:nvPr/>
+          </p:nvSpPr>
+          <p:spPr>
+            <a:xfrm>
+              <a:off x="0" y="-1"/>
+              <a:ext cx="914400" cy="457200"/>
+            </a:xfrm>
+            <a:prstGeom prst="rect">
+              <a:avLst/>
+            </a:prstGeom>
+            <a:solidFill>
+              <a:schemeClr val="bg1"/>
+            </a:solidFill>
+            <a:ln>
+              <a:noFill/>
+            </a:ln>
+          </p:spPr>
+          <p:style>
+            <a:lnRef idx="2">
+              <a:schemeClr val="accent1">
+                <a:shade val="50000"/>
+              </a:schemeClr>
+            </a:lnRef>
+            <a:fillRef idx="1">
+              <a:schemeClr val="accent1"/>
+            </a:fillRef>
+            <a:effectRef idx="0">
+              <a:schemeClr val="accent1"/>
+            </a:effectRef>
+            <a:fontRef idx="minor">
+              <a:schemeClr val="lt1"/>
+            </a:fontRef>
+          </p:style>
+          <p:txBody>
+            <a:bodyPr rtlCol="0" anchor="ctr"/>
+            <a:lstStyle/>
+            <a:p>
+              <a:pPr algn="ctr"/>
+              <a:endParaRPr lang="en-US" dirty="0"/>
+            </a:p>
+          </p:txBody>
+        </p:sp>
+        <p:sp>
+          <p:nvSpPr>
+            <p:cNvPr id="10" name="Rectangle 9"/>
+            <p:cNvSpPr/>
+            <p:nvPr/>
+          </p:nvSpPr>
+          <p:spPr>
+            <a:xfrm>
+              <a:off x="0" y="228599"/>
+              <a:ext cx="457200" cy="228600"/>
+            </a:xfrm>
+            <a:prstGeom prst="rect">
+              <a:avLst/>
+            </a:prstGeom>
+            <a:solidFill>
+              <a:schemeClr val="tx1"/>
+            </a:solidFill>
+            <a:ln>
+              <a:noFill/>
+            </a:ln>
+          </p:spPr>
+          <p:style>
+            <a:lnRef idx="2">
+              <a:schemeClr val="accent1">
+                <a:shade val="50000"/>
+              </a:schemeClr>
+            </a:lnRef>
+            <a:fillRef idx="1">
+              <a:schemeClr val="accent1"/>
+            </a:fillRef>
+            <a:effectRef idx="0">
+              <a:schemeClr val="accent1"/>
+            </a:effectRef>
+            <a:fontRef idx="minor">
+              <a:schemeClr val="lt1"/>
+            </a:fontRef>
+          </p:style>
+          <p:txBody>
+            <a:bodyPr rtlCol="0" anchor="ctr"/>
+            <a:lstStyle/>
+            <a:p>
+              <a:pPr algn="ctr"/>
+              <a:endParaRPr lang="en-US"/>
+            </a:p>
+          </p:txBody>
+        </p:sp>
+        <p:sp>
+          <p:nvSpPr>
+            <p:cNvPr id="11" name="Rectangle 10"/>
+            <p:cNvSpPr/>
+            <p:nvPr/>
+          </p:nvSpPr>
+          <p:spPr>
+            <a:xfrm>
+              <a:off x="457200" y="-1"/>
+              <a:ext cx="457200" cy="228600"/>
+            </a:xfrm>
+            <a:prstGeom prst="rect">
+              <a:avLst/>
+            </a:prstGeom>
+            <a:solidFill>
+              <a:schemeClr val="tx1"/>
+            </a:solidFill>
+            <a:ln>
+              <a:noFill/>
+            </a:ln>
+          </p:spPr>
+          <p:style>
+            <a:lnRef idx="2">
+              <a:schemeClr val="accent1">
+                <a:shade val="50000"/>
+              </a:schemeClr>
+            </a:lnRef>
+            <a:fillRef idx="1">
+              <a:schemeClr val="accent1"/>
+            </a:fillRef>
+            <a:effectRef idx="0">
+              <a:schemeClr val="accent1"/>
+            </a:effectRef>
+            <a:fontRef idx="minor">
+              <a:schemeClr val="lt1"/>
+            </a:fontRef>
+          </p:style>
+          <p:txBody>
+            <a:bodyPr rtlCol="0" anchor="ctr"/>
+            <a:lstStyle/>
+            <a:p>
+              <a:pPr algn="ctr"/>
+              <a:endParaRPr lang="en-US"/>
+            </a:p>
+          </p:txBody>
+        </p:sp>
+      </p:grpSp>
+      <p:grpSp>
+        <p:nvGrpSpPr>
+          <p:cNvPr id="12" name="Group 11"/>
+          <p:cNvGrpSpPr/>
+          <p:nvPr/>
+        </p:nvGrpSpPr>
+        <p:grpSpPr>
+          <a:xfrm>
+            <a:off x="11277600" y="6400800"/>
+            <a:ext cx="914400" cy="457200"/>
+            <a:chOff x="0" y="-1"/>
+            <a:chExt cx="914400" cy="457200"/>
+          </a:xfrm>
+        </p:grpSpPr>
+        <p:sp>
+          <p:nvSpPr>
+            <p:cNvPr id="13" name="Rectangle 12"/>
+            <p:cNvSpPr/>
+            <p:nvPr/>
+          </p:nvSpPr>
+          <p:spPr>
+            <a:xfrm>
+              <a:off x="0" y="-1"/>
+              <a:ext cx="914400" cy="457200"/>
+            </a:xfrm>
+            <a:prstGeom prst="rect">
+              <a:avLst/>
+            </a:prstGeom>
+            <a:solidFill>
+              <a:schemeClr val="bg1"/>
+            </a:solidFill>
+            <a:ln>
+              <a:noFill/>
+            </a:ln>
+          </p:spPr>
+          <p:style>
+            <a:lnRef idx="2">
+              <a:schemeClr val="accent1">
+                <a:shade val="50000"/>
+              </a:schemeClr>
+            </a:lnRef>
+            <a:fillRef idx="1">
+              <a:schemeClr val="accent1"/>
+            </a:fillRef>
+            <a:effectRef idx="0">
+              <a:schemeClr val="accent1"/>
+            </a:effectRef>
+            <a:fontRef idx="minor">
+              <a:schemeClr val="lt1"/>
+            </a:fontRef>
+          </p:style>
+          <p:txBody>
+            <a:bodyPr rtlCol="0" anchor="ctr"/>
+            <a:lstStyle/>
+            <a:p>
+              <a:pPr algn="ctr"/>
+              <a:endParaRPr lang="en-US" dirty="0"/>
+            </a:p>
+          </p:txBody>
+        </p:sp>
+        <p:sp>
+          <p:nvSpPr>
+            <p:cNvPr id="14" name="Rectangle 13"/>
+            <p:cNvSpPr/>
+            <p:nvPr/>
+          </p:nvSpPr>
+          <p:spPr>
+            <a:xfrm>
+              <a:off x="0" y="228599"/>
+              <a:ext cx="457200" cy="228600"/>
+            </a:xfrm>
+            <a:prstGeom prst="rect">
+              <a:avLst/>
+            </a:prstGeom>
+            <a:solidFill>
+              <a:schemeClr val="tx1"/>
+            </a:solidFill>
+            <a:ln>
+              <a:noFill/>
+            </a:ln>
+          </p:spPr>
+          <p:style>
+            <a:lnRef idx="2">
+              <a:schemeClr val="accent1">
+                <a:shade val="50000"/>
+              </a:schemeClr>
+            </a:lnRef>
+            <a:fillRef idx="1">
+              <a:schemeClr val="accent1"/>
+            </a:fillRef>
+            <a:effectRef idx="0">
+              <a:schemeClr val="accent1"/>
+            </a:effectRef>
+            <a:fontRef idx="minor">
+              <a:schemeClr val="lt1"/>
+            </a:fontRef>
+          </p:style>
+          <p:txBody>
+            <a:bodyPr rtlCol="0" anchor="ctr"/>
+            <a:lstStyle/>
+            <a:p>
+              <a:pPr algn="ctr"/>
+              <a:endParaRPr lang="en-US"/>
+            </a:p>
+          </p:txBody>
+        </p:sp>
+        <p:sp>
+          <p:nvSpPr>
+            <p:cNvPr id="15" name="Rectangle 14"/>
+            <p:cNvSpPr/>
+            <p:nvPr/>
+          </p:nvSpPr>
+          <p:spPr>
+            <a:xfrm>
+              <a:off x="457200" y="-1"/>
+              <a:ext cx="457200" cy="228600"/>
+            </a:xfrm>
+            <a:prstGeom prst="rect">
+              <a:avLst/>
+            </a:prstGeom>
+            <a:solidFill>
+              <a:schemeClr val="tx1"/>
+            </a:solidFill>
+            <a:ln>
+              <a:noFill/>
+            </a:ln>
+          </p:spPr>
+          <p:style>
+            <a:lnRef idx="2">
+              <a:schemeClr val="accent1">
+                <a:shade val="50000"/>
+              </a:schemeClr>
+            </a:lnRef>
+            <a:fillRef idx="1">
+              <a:schemeClr val="accent1"/>
+            </a:fillRef>
+            <a:effectRef idx="0">
+              <a:schemeClr val="accent1"/>
+            </a:effectRef>
+            <a:fontRef idx="minor">
+              <a:schemeClr val="lt1"/>
+            </a:fontRef>
+          </p:style>
+          <p:txBody>
+            <a:bodyPr rtlCol="0" anchor="ctr"/>
+            <a:lstStyle/>
+            <a:p>
+              <a:pPr algn="ctr"/>
+              <a:endParaRPr lang="en-US"/>
+            </a:p>
+          </p:txBody>
+        </p:sp>
+      </p:grpSp>
     </p:spTree>
     <p:extLst>
       <p:ext uri="{BB962C8B-B14F-4D97-AF65-F5344CB8AC3E}">
-        <p14:creationId xmlns:p14="http://schemas.microsoft.com/office/powerpoint/2010/main" val="2592789313"/>
+        <p14:creationId xmlns:p14="http://schemas.microsoft.com/office/powerpoint/2010/main" val="3018714894"/>
       </p:ext>
     </p:extLst>
   </p:cSld>

</xml_diff>